<commit_message>
initialize PPTX presentation and create winform and wpf showcase
</commit_message>
<xml_diff>
--- a/presentation/DOTNETCORE_3.0_CICD_AzureDevOps.pptx
+++ b/presentation/DOTNETCORE_3.0_CICD_AzureDevOps.pptx
@@ -11,23 +11,26 @@
     <p:sldId id="257" r:id="rId5"/>
     <p:sldId id="260" r:id="rId6"/>
     <p:sldId id="261" r:id="rId7"/>
-    <p:sldId id="264" r:id="rId8"/>
-    <p:sldId id="265" r:id="rId9"/>
-    <p:sldId id="270" r:id="rId10"/>
-    <p:sldId id="266" r:id="rId11"/>
-    <p:sldId id="267" r:id="rId12"/>
-    <p:sldId id="278" r:id="rId13"/>
-    <p:sldId id="279" r:id="rId14"/>
-    <p:sldId id="272" r:id="rId15"/>
-    <p:sldId id="275" r:id="rId16"/>
-    <p:sldId id="262" r:id="rId17"/>
-    <p:sldId id="263" r:id="rId18"/>
-    <p:sldId id="274" r:id="rId19"/>
-    <p:sldId id="268" r:id="rId20"/>
-    <p:sldId id="271" r:id="rId21"/>
-    <p:sldId id="273" r:id="rId22"/>
-    <p:sldId id="276" r:id="rId23"/>
-    <p:sldId id="277" r:id="rId24"/>
+    <p:sldId id="280" r:id="rId8"/>
+    <p:sldId id="281" r:id="rId9"/>
+    <p:sldId id="264" r:id="rId10"/>
+    <p:sldId id="265" r:id="rId11"/>
+    <p:sldId id="270" r:id="rId12"/>
+    <p:sldId id="266" r:id="rId13"/>
+    <p:sldId id="267" r:id="rId14"/>
+    <p:sldId id="278" r:id="rId15"/>
+    <p:sldId id="279" r:id="rId16"/>
+    <p:sldId id="272" r:id="rId17"/>
+    <p:sldId id="275" r:id="rId18"/>
+    <p:sldId id="262" r:id="rId19"/>
+    <p:sldId id="263" r:id="rId20"/>
+    <p:sldId id="274" r:id="rId21"/>
+    <p:sldId id="268" r:id="rId22"/>
+    <p:sldId id="271" r:id="rId23"/>
+    <p:sldId id="273" r:id="rId24"/>
+    <p:sldId id="276" r:id="rId25"/>
+    <p:sldId id="282" r:id="rId26"/>
+    <p:sldId id="277" r:id="rId27"/>
   </p:sldIdLst>
   <p:sldSz cx="12192000" cy="6858000"/>
   <p:notesSz cx="6858000" cy="9144000"/>
@@ -145,6 +148,8 @@
             <p14:sldId id="257"/>
             <p14:sldId id="260"/>
             <p14:sldId id="261"/>
+            <p14:sldId id="280"/>
+            <p14:sldId id="281"/>
             <p14:sldId id="264"/>
             <p14:sldId id="265"/>
             <p14:sldId id="270"/>
@@ -161,6 +166,7 @@
             <p14:sldId id="271"/>
             <p14:sldId id="273"/>
             <p14:sldId id="276"/>
+            <p14:sldId id="282"/>
           </p14:sldIdLst>
         </p14:section>
         <p14:section name="Q and A and ending note" id="{1C807DE8-BCA9-4728-96CF-9283B4D6A20C}">
@@ -6295,7 +6301,7 @@
           <p:cNvPr id="2" name="Title 1">
             <a:extLst>
               <a:ext uri="{FF2B5EF4-FFF2-40B4-BE49-F238E27FC236}">
-                <a16:creationId xmlns:a16="http://schemas.microsoft.com/office/drawing/2014/main" id="{1E2C754A-1B3B-4789-B35A-A0A5DB7A1D28}"/>
+                <a16:creationId xmlns:a16="http://schemas.microsoft.com/office/drawing/2014/main" id="{E38557FF-E1BC-4546-9FDB-3AC9F359F25B}"/>
               </a:ext>
             </a:extLst>
           </p:cNvPr>
@@ -6313,7 +6319,7 @@
           <a:p>
             <a:r>
               <a:rPr lang="en-US" dirty="0"/>
-              <a:t>Importance of ensuring successful build locally</a:t>
+              <a:t>Tooling version train example</a:t>
             </a:r>
           </a:p>
         </p:txBody>
@@ -6323,7 +6329,7 @@
           <p:cNvPr id="3" name="Content Placeholder 2">
             <a:extLst>
               <a:ext uri="{FF2B5EF4-FFF2-40B4-BE49-F238E27FC236}">
-                <a16:creationId xmlns:a16="http://schemas.microsoft.com/office/drawing/2014/main" id="{9F74019D-32FA-49F8-8B7D-52F06E34CD1F}"/>
+                <a16:creationId xmlns:a16="http://schemas.microsoft.com/office/drawing/2014/main" id="{58E4C3AF-F523-4B29-A996-2E5346D31428}"/>
               </a:ext>
             </a:extLst>
           </p:cNvPr>
@@ -6336,54 +6342,47 @@
         </p:nvSpPr>
         <p:spPr/>
         <p:txBody>
-          <a:bodyPr>
-            <a:normAutofit lnSpcReduction="10000"/>
-          </a:bodyPr>
-          <a:lstStyle/>
-          <a:p>
-            <a:pPr marL="457200" indent="-457200">
-              <a:buFont typeface="+mj-lt"/>
-              <a:buAutoNum type="arabicPeriod"/>
-            </a:pPr>
-            <a:r>
-              <a:rPr lang="en-US" dirty="0"/>
-              <a:t>Having whole build to quickly check at command prompt before creating PR and going through CI will ensure catching up build warnings and error early, not trapped within Visual Studio.</a:t>
-            </a:r>
-          </a:p>
-          <a:p>
-            <a:pPr marL="457200" indent="-457200">
-              <a:buFont typeface="+mj-lt"/>
-              <a:buAutoNum type="arabicPeriod"/>
-            </a:pPr>
-            <a:r>
-              <a:rPr lang="en-US" dirty="0"/>
-              <a:t>Good practice of knowing </a:t>
-            </a:r>
-            <a:r>
-              <a:rPr lang="en-US" dirty="0" err="1"/>
-              <a:t>MSBuild</a:t>
-            </a:r>
-            <a:r>
-              <a:rPr lang="en-US" dirty="0"/>
-              <a:t> necessary compile parameters to in sync with CI build. </a:t>
-            </a:r>
-          </a:p>
-          <a:p>
-            <a:pPr marL="457200" indent="-457200">
-              <a:buFont typeface="+mj-lt"/>
-              <a:buAutoNum type="arabicPeriod"/>
-            </a:pPr>
-            <a:r>
-              <a:rPr lang="en-US" dirty="0"/>
-              <a:t>The better way is scripted. For example: MS usually has scripted “build.cmd” (or “build.sh” on Linux) to compile their .NET Core FX codebase that functions equally when having CI</a:t>
-            </a:r>
-          </a:p>
-        </p:txBody>
-      </p:sp>
+          <a:bodyPr/>
+          <a:lstStyle/>
+          <a:p>
+            <a:endParaRPr lang="en-US"/>
+          </a:p>
+        </p:txBody>
+      </p:sp>
+      <p:pic>
+        <p:nvPicPr>
+          <p:cNvPr id="4" name="Picture 3">
+            <a:extLst>
+              <a:ext uri="{FF2B5EF4-FFF2-40B4-BE49-F238E27FC236}">
+                <a16:creationId xmlns:a16="http://schemas.microsoft.com/office/drawing/2014/main" id="{B3ADDA22-8155-4A16-B2E0-85B74A7AA704}"/>
+              </a:ext>
+            </a:extLst>
+          </p:cNvPr>
+          <p:cNvPicPr>
+            <a:picLocks noChangeAspect="1"/>
+          </p:cNvPicPr>
+          <p:nvPr/>
+        </p:nvPicPr>
+        <p:blipFill>
+          <a:blip r:embed="rId2"/>
+          <a:stretch>
+            <a:fillRect/>
+          </a:stretch>
+        </p:blipFill>
+        <p:spPr>
+          <a:xfrm>
+            <a:off x="2818294" y="1859529"/>
+            <a:ext cx="7133780" cy="4790192"/>
+          </a:xfrm>
+          <a:prstGeom prst="rect">
+            <a:avLst/>
+          </a:prstGeom>
+        </p:spPr>
+      </p:pic>
     </p:spTree>
     <p:extLst>
       <p:ext uri="{BB962C8B-B14F-4D97-AF65-F5344CB8AC3E}">
-        <p14:creationId xmlns:p14="http://schemas.microsoft.com/office/powerpoint/2010/main" val="2141204565"/>
+        <p14:creationId xmlns:p14="http://schemas.microsoft.com/office/powerpoint/2010/main" val="3332274354"/>
       </p:ext>
     </p:extLst>
   </p:cSld>
@@ -6415,7 +6414,7 @@
           <p:cNvPr id="2" name="Title 1">
             <a:extLst>
               <a:ext uri="{FF2B5EF4-FFF2-40B4-BE49-F238E27FC236}">
-                <a16:creationId xmlns:a16="http://schemas.microsoft.com/office/drawing/2014/main" id="{A3A23675-AE8C-42F4-9EB5-00C9F534F7E5}"/>
+                <a16:creationId xmlns:a16="http://schemas.microsoft.com/office/drawing/2014/main" id="{47FA67C2-3AB9-4159-A9FB-E069A5B85A39}"/>
               </a:ext>
             </a:extLst>
           </p:cNvPr>
@@ -6433,8 +6432,13 @@
           <a:p>
             <a:r>
               <a:rPr lang="en-US" dirty="0"/>
-              <a:t>Ensuring successful local build</a:t>
-            </a:r>
+              <a:t>The implicit tooling requirement of </a:t>
+            </a:r>
+            <a:r>
+              <a:rPr lang="en-US" dirty="0" err="1"/>
+              <a:t>nuget</a:t>
+            </a:r>
+            <a:endParaRPr lang="en-US" dirty="0"/>
           </a:p>
         </p:txBody>
       </p:sp>
@@ -6443,7 +6447,7 @@
           <p:cNvPr id="3" name="Content Placeholder 2">
             <a:extLst>
               <a:ext uri="{FF2B5EF4-FFF2-40B4-BE49-F238E27FC236}">
-                <a16:creationId xmlns:a16="http://schemas.microsoft.com/office/drawing/2014/main" id="{79843FEC-D0A4-424E-839B-2F0E7C36028E}"/>
+                <a16:creationId xmlns:a16="http://schemas.microsoft.com/office/drawing/2014/main" id="{635157A1-A06A-492E-AC1D-4F2CA44B643C}"/>
               </a:ext>
             </a:extLst>
           </p:cNvPr>
@@ -6456,107 +6460,47 @@
         </p:nvSpPr>
         <p:spPr/>
         <p:txBody>
-          <a:bodyPr>
-            <a:normAutofit fontScale="62500" lnSpcReduction="20000"/>
-          </a:bodyPr>
-          <a:lstStyle/>
-          <a:p>
-            <a:r>
-              <a:rPr lang="en-US" dirty="0"/>
-              <a:t>Define the .NET Core SDK version in </a:t>
-            </a:r>
-            <a:r>
-              <a:rPr lang="en-US" dirty="0" err="1"/>
-              <a:t>global.json</a:t>
-            </a:r>
-            <a:r>
-              <a:rPr lang="en-US" dirty="0"/>
-              <a:t> in the codebase folder. Usually, this means the root of the repo. Do not define the </a:t>
-            </a:r>
-            <a:r>
-              <a:rPr lang="en-US" dirty="0" err="1"/>
-              <a:t>global.json</a:t>
-            </a:r>
-            <a:r>
-              <a:rPr lang="en-US" dirty="0"/>
-              <a:t> in the project folder, as this will apply the SDK version for that folder only.</a:t>
-            </a:r>
-          </a:p>
-          <a:p>
-            <a:r>
-              <a:rPr lang="en-US" dirty="0"/>
-              <a:t>The .NET Core SDK version specified should dictate the version used in CI later. At least, it should be used as guidance that it is used by codebase successfully, and it is to avoid confusion when the codebase is compiled on different machine with different SDK installed.</a:t>
-            </a:r>
-          </a:p>
-          <a:p>
-            <a:r>
-              <a:rPr lang="en-US" dirty="0"/>
-              <a:t>If you want to target multiple version of .NET Core, then it is not recommended to use </a:t>
-            </a:r>
-            <a:r>
-              <a:rPr lang="en-US" dirty="0" err="1"/>
-              <a:t>global.json</a:t>
-            </a:r>
-            <a:r>
-              <a:rPr lang="en-US" dirty="0"/>
-              <a:t> to drive SDK version used to build</a:t>
-            </a:r>
-          </a:p>
-          <a:p>
-            <a:r>
-              <a:rPr lang="en-US" dirty="0"/>
-              <a:t>Do the build on command prompt first, not just on Visual Studio. This will ensure successful CI build.</a:t>
-            </a:r>
-          </a:p>
-          <a:p>
-            <a:r>
-              <a:rPr lang="en-US" dirty="0"/>
-              <a:t>Before build, use separate dotnet restore (or </a:t>
-            </a:r>
-            <a:r>
-              <a:rPr lang="en-US" dirty="0" err="1"/>
-              <a:t>nuget</a:t>
-            </a:r>
-            <a:r>
-              <a:rPr lang="en-US" dirty="0"/>
-              <a:t> restore) if we use other third party </a:t>
-            </a:r>
-            <a:r>
-              <a:rPr lang="en-US" dirty="0" err="1"/>
-              <a:t>nuget</a:t>
-            </a:r>
-            <a:endParaRPr lang="en-US" dirty="0"/>
-          </a:p>
-          <a:p>
-            <a:r>
-              <a:rPr lang="en-US" dirty="0"/>
-              <a:t>Pay attention on the version compatibility of the third party </a:t>
-            </a:r>
-            <a:r>
-              <a:rPr lang="en-US" dirty="0" err="1"/>
-              <a:t>nuget</a:t>
-            </a:r>
-            <a:r>
-              <a:rPr lang="en-US" dirty="0"/>
-              <a:t> used. For example: avoid third party libraries that use explicit .NET Standard before 1.6. Check the dependencies before using it, and then check against the version used by .NET Core 2.1. See </a:t>
-            </a:r>
-            <a:r>
-              <a:rPr lang="en-US" dirty="0">
-                <a:hlinkClick r:id="rId2"/>
-              </a:rPr>
-              <a:t>https://apisof.net</a:t>
-            </a:r>
-            <a:r>
-              <a:rPr lang="en-US" dirty="0"/>
-              <a:t> to check further</a:t>
-            </a:r>
-          </a:p>
-        </p:txBody>
-      </p:sp>
+          <a:bodyPr/>
+          <a:lstStyle/>
+          <a:p>
+            <a:endParaRPr lang="en-US"/>
+          </a:p>
+        </p:txBody>
+      </p:sp>
+      <p:pic>
+        <p:nvPicPr>
+          <p:cNvPr id="4" name="Picture 3">
+            <a:extLst>
+              <a:ext uri="{FF2B5EF4-FFF2-40B4-BE49-F238E27FC236}">
+                <a16:creationId xmlns:a16="http://schemas.microsoft.com/office/drawing/2014/main" id="{70F9FE10-7206-4788-95E8-86EDA118D373}"/>
+              </a:ext>
+            </a:extLst>
+          </p:cNvPr>
+          <p:cNvPicPr>
+            <a:picLocks noChangeAspect="1"/>
+          </p:cNvPicPr>
+          <p:nvPr/>
+        </p:nvPicPr>
+        <p:blipFill>
+          <a:blip r:embed="rId2"/>
+          <a:stretch>
+            <a:fillRect/>
+          </a:stretch>
+        </p:blipFill>
+        <p:spPr>
+          <a:xfrm>
+            <a:off x="2136937" y="2666999"/>
+            <a:ext cx="8713457" cy="2870181"/>
+          </a:xfrm>
+          <a:prstGeom prst="rect">
+            <a:avLst/>
+          </a:prstGeom>
+        </p:spPr>
+      </p:pic>
     </p:spTree>
     <p:extLst>
       <p:ext uri="{BB962C8B-B14F-4D97-AF65-F5344CB8AC3E}">
-        <p14:creationId xmlns:p14="http://schemas.microsoft.com/office/powerpoint/2010/main" val="3868607337"/>
+        <p14:creationId xmlns:p14="http://schemas.microsoft.com/office/powerpoint/2010/main" val="2175539987"/>
       </p:ext>
     </p:extLst>
   </p:cSld>
@@ -6588,6 +6532,299 @@
           <p:cNvPr id="2" name="Title 1">
             <a:extLst>
               <a:ext uri="{FF2B5EF4-FFF2-40B4-BE49-F238E27FC236}">
+                <a16:creationId xmlns:a16="http://schemas.microsoft.com/office/drawing/2014/main" id="{1E2C754A-1B3B-4789-B35A-A0A5DB7A1D28}"/>
+              </a:ext>
+            </a:extLst>
+          </p:cNvPr>
+          <p:cNvSpPr>
+            <a:spLocks noGrp="1"/>
+          </p:cNvSpPr>
+          <p:nvPr>
+            <p:ph type="title"/>
+          </p:nvPr>
+        </p:nvSpPr>
+        <p:spPr/>
+        <p:txBody>
+          <a:bodyPr/>
+          <a:lstStyle/>
+          <a:p>
+            <a:r>
+              <a:rPr lang="en-US" dirty="0"/>
+              <a:t>Importance of ensuring successful build locally</a:t>
+            </a:r>
+          </a:p>
+        </p:txBody>
+      </p:sp>
+      <p:sp>
+        <p:nvSpPr>
+          <p:cNvPr id="3" name="Content Placeholder 2">
+            <a:extLst>
+              <a:ext uri="{FF2B5EF4-FFF2-40B4-BE49-F238E27FC236}">
+                <a16:creationId xmlns:a16="http://schemas.microsoft.com/office/drawing/2014/main" id="{9F74019D-32FA-49F8-8B7D-52F06E34CD1F}"/>
+              </a:ext>
+            </a:extLst>
+          </p:cNvPr>
+          <p:cNvSpPr>
+            <a:spLocks noGrp="1"/>
+          </p:cNvSpPr>
+          <p:nvPr>
+            <p:ph idx="1"/>
+          </p:nvPr>
+        </p:nvSpPr>
+        <p:spPr/>
+        <p:txBody>
+          <a:bodyPr>
+            <a:normAutofit lnSpcReduction="10000"/>
+          </a:bodyPr>
+          <a:lstStyle/>
+          <a:p>
+            <a:pPr marL="457200" indent="-457200">
+              <a:buFont typeface="+mj-lt"/>
+              <a:buAutoNum type="arabicPeriod"/>
+            </a:pPr>
+            <a:r>
+              <a:rPr lang="en-US" dirty="0"/>
+              <a:t>Having whole build to quickly check at command prompt before creating PR and going through CI will ensure catching up build warnings and error early, not trapped within Visual Studio.</a:t>
+            </a:r>
+          </a:p>
+          <a:p>
+            <a:pPr marL="457200" indent="-457200">
+              <a:buFont typeface="+mj-lt"/>
+              <a:buAutoNum type="arabicPeriod"/>
+            </a:pPr>
+            <a:r>
+              <a:rPr lang="en-US" dirty="0"/>
+              <a:t>Good practice of knowing </a:t>
+            </a:r>
+            <a:r>
+              <a:rPr lang="en-US" dirty="0" err="1"/>
+              <a:t>MSBuild</a:t>
+            </a:r>
+            <a:r>
+              <a:rPr lang="en-US" dirty="0"/>
+              <a:t> necessary compile parameters to in sync with CI build. </a:t>
+            </a:r>
+          </a:p>
+          <a:p>
+            <a:pPr marL="457200" indent="-457200">
+              <a:buFont typeface="+mj-lt"/>
+              <a:buAutoNum type="arabicPeriod"/>
+            </a:pPr>
+            <a:r>
+              <a:rPr lang="en-US" dirty="0"/>
+              <a:t>The better way is scripted. For example: MS usually has scripted “build.cmd” (or “build.sh” on Linux) to compile their .NET Core FX codebase that functions equally when having CI</a:t>
+            </a:r>
+          </a:p>
+        </p:txBody>
+      </p:sp>
+    </p:spTree>
+    <p:extLst>
+      <p:ext uri="{BB962C8B-B14F-4D97-AF65-F5344CB8AC3E}">
+        <p14:creationId xmlns:p14="http://schemas.microsoft.com/office/powerpoint/2010/main" val="2141204565"/>
+      </p:ext>
+    </p:extLst>
+  </p:cSld>
+  <p:clrMapOvr>
+    <a:masterClrMapping/>
+  </p:clrMapOvr>
+</p:sld>
+</file>
+
+<file path=ppt/slides/slide13.xml><?xml version="1.0" encoding="utf-8"?>
+<p:sld xmlns:a="http://schemas.openxmlformats.org/drawingml/2006/main" xmlns:r="http://schemas.openxmlformats.org/officeDocument/2006/relationships" xmlns:p="http://schemas.openxmlformats.org/presentationml/2006/main">
+  <p:cSld>
+    <p:spTree>
+      <p:nvGrpSpPr>
+        <p:cNvPr id="1" name=""/>
+        <p:cNvGrpSpPr/>
+        <p:nvPr/>
+      </p:nvGrpSpPr>
+      <p:grpSpPr>
+        <a:xfrm>
+          <a:off x="0" y="0"/>
+          <a:ext cx="0" cy="0"/>
+          <a:chOff x="0" y="0"/>
+          <a:chExt cx="0" cy="0"/>
+        </a:xfrm>
+      </p:grpSpPr>
+      <p:sp>
+        <p:nvSpPr>
+          <p:cNvPr id="2" name="Title 1">
+            <a:extLst>
+              <a:ext uri="{FF2B5EF4-FFF2-40B4-BE49-F238E27FC236}">
+                <a16:creationId xmlns:a16="http://schemas.microsoft.com/office/drawing/2014/main" id="{A3A23675-AE8C-42F4-9EB5-00C9F534F7E5}"/>
+              </a:ext>
+            </a:extLst>
+          </p:cNvPr>
+          <p:cNvSpPr>
+            <a:spLocks noGrp="1"/>
+          </p:cNvSpPr>
+          <p:nvPr>
+            <p:ph type="title"/>
+          </p:nvPr>
+        </p:nvSpPr>
+        <p:spPr/>
+        <p:txBody>
+          <a:bodyPr/>
+          <a:lstStyle/>
+          <a:p>
+            <a:r>
+              <a:rPr lang="en-US" dirty="0"/>
+              <a:t>Ensuring successful local build</a:t>
+            </a:r>
+          </a:p>
+        </p:txBody>
+      </p:sp>
+      <p:sp>
+        <p:nvSpPr>
+          <p:cNvPr id="3" name="Content Placeholder 2">
+            <a:extLst>
+              <a:ext uri="{FF2B5EF4-FFF2-40B4-BE49-F238E27FC236}">
+                <a16:creationId xmlns:a16="http://schemas.microsoft.com/office/drawing/2014/main" id="{79843FEC-D0A4-424E-839B-2F0E7C36028E}"/>
+              </a:ext>
+            </a:extLst>
+          </p:cNvPr>
+          <p:cNvSpPr>
+            <a:spLocks noGrp="1"/>
+          </p:cNvSpPr>
+          <p:nvPr>
+            <p:ph idx="1"/>
+          </p:nvPr>
+        </p:nvSpPr>
+        <p:spPr/>
+        <p:txBody>
+          <a:bodyPr>
+            <a:normAutofit fontScale="62500" lnSpcReduction="20000"/>
+          </a:bodyPr>
+          <a:lstStyle/>
+          <a:p>
+            <a:r>
+              <a:rPr lang="en-US" dirty="0"/>
+              <a:t>Define the .NET Core SDK version in </a:t>
+            </a:r>
+            <a:r>
+              <a:rPr lang="en-US" dirty="0" err="1"/>
+              <a:t>global.json</a:t>
+            </a:r>
+            <a:r>
+              <a:rPr lang="en-US" dirty="0"/>
+              <a:t> in the codebase folder. Usually, this means the root of the repo. Do not define the </a:t>
+            </a:r>
+            <a:r>
+              <a:rPr lang="en-US" dirty="0" err="1"/>
+              <a:t>global.json</a:t>
+            </a:r>
+            <a:r>
+              <a:rPr lang="en-US" dirty="0"/>
+              <a:t> in the project folder, as this will apply the SDK version for that folder only.</a:t>
+            </a:r>
+          </a:p>
+          <a:p>
+            <a:r>
+              <a:rPr lang="en-US" dirty="0"/>
+              <a:t>The .NET Core SDK version specified should dictate the version used in CI later. At least, it should be used as guidance that it is used by codebase successfully, and it is to avoid confusion when the codebase is compiled on different machine with different SDK installed.</a:t>
+            </a:r>
+          </a:p>
+          <a:p>
+            <a:r>
+              <a:rPr lang="en-US" dirty="0"/>
+              <a:t>If you want to target multiple version of .NET Core, then it is not recommended to use </a:t>
+            </a:r>
+            <a:r>
+              <a:rPr lang="en-US" dirty="0" err="1"/>
+              <a:t>global.json</a:t>
+            </a:r>
+            <a:r>
+              <a:rPr lang="en-US" dirty="0"/>
+              <a:t> to drive SDK version used to build</a:t>
+            </a:r>
+          </a:p>
+          <a:p>
+            <a:r>
+              <a:rPr lang="en-US" dirty="0"/>
+              <a:t>Do the build on command prompt first, not just on Visual Studio. This will ensure successful CI build.</a:t>
+            </a:r>
+          </a:p>
+          <a:p>
+            <a:r>
+              <a:rPr lang="en-US" dirty="0"/>
+              <a:t>Before build, use separate dotnet restore (or </a:t>
+            </a:r>
+            <a:r>
+              <a:rPr lang="en-US" dirty="0" err="1"/>
+              <a:t>nuget</a:t>
+            </a:r>
+            <a:r>
+              <a:rPr lang="en-US" dirty="0"/>
+              <a:t> restore) if we use other third party </a:t>
+            </a:r>
+            <a:r>
+              <a:rPr lang="en-US" dirty="0" err="1"/>
+              <a:t>nuget</a:t>
+            </a:r>
+            <a:endParaRPr lang="en-US" dirty="0"/>
+          </a:p>
+          <a:p>
+            <a:r>
+              <a:rPr lang="en-US" dirty="0"/>
+              <a:t>Pay attention on the version compatibility of the third party </a:t>
+            </a:r>
+            <a:r>
+              <a:rPr lang="en-US" dirty="0" err="1"/>
+              <a:t>nuget</a:t>
+            </a:r>
+            <a:r>
+              <a:rPr lang="en-US" dirty="0"/>
+              <a:t> used. For example: avoid third party libraries that use explicit .NET Standard before 1.6. Check the dependencies before using it, and then check against the version used by .NET Core 2.1. See </a:t>
+            </a:r>
+            <a:r>
+              <a:rPr lang="en-US" dirty="0">
+                <a:hlinkClick r:id="rId2"/>
+              </a:rPr>
+              <a:t>https://apisof.net</a:t>
+            </a:r>
+            <a:r>
+              <a:rPr lang="en-US" dirty="0"/>
+              <a:t> to check further</a:t>
+            </a:r>
+          </a:p>
+        </p:txBody>
+      </p:sp>
+    </p:spTree>
+    <p:extLst>
+      <p:ext uri="{BB962C8B-B14F-4D97-AF65-F5344CB8AC3E}">
+        <p14:creationId xmlns:p14="http://schemas.microsoft.com/office/powerpoint/2010/main" val="3868607337"/>
+      </p:ext>
+    </p:extLst>
+  </p:cSld>
+  <p:clrMapOvr>
+    <a:masterClrMapping/>
+  </p:clrMapOvr>
+</p:sld>
+</file>
+
+<file path=ppt/slides/slide14.xml><?xml version="1.0" encoding="utf-8"?>
+<p:sld xmlns:a="http://schemas.openxmlformats.org/drawingml/2006/main" xmlns:r="http://schemas.openxmlformats.org/officeDocument/2006/relationships" xmlns:p="http://schemas.openxmlformats.org/presentationml/2006/main">
+  <p:cSld>
+    <p:spTree>
+      <p:nvGrpSpPr>
+        <p:cNvPr id="1" name=""/>
+        <p:cNvGrpSpPr/>
+        <p:nvPr/>
+      </p:nvGrpSpPr>
+      <p:grpSpPr>
+        <a:xfrm>
+          <a:off x="0" y="0"/>
+          <a:ext cx="0" cy="0"/>
+          <a:chOff x="0" y="0"/>
+          <a:chExt cx="0" cy="0"/>
+        </a:xfrm>
+      </p:grpSpPr>
+      <p:sp>
+        <p:nvSpPr>
+          <p:cNvPr id="2" name="Title 1">
+            <a:extLst>
+              <a:ext uri="{FF2B5EF4-FFF2-40B4-BE49-F238E27FC236}">
                 <a16:creationId xmlns:a16="http://schemas.microsoft.com/office/drawing/2014/main" id="{18C99AD6-9123-496B-A21B-A329375F1352}"/>
               </a:ext>
             </a:extLst>
@@ -6747,7 +6984,7 @@
 </p:sld>
 </file>
 
-<file path=ppt/slides/slide13.xml><?xml version="1.0" encoding="utf-8"?>
+<file path=ppt/slides/slide15.xml><?xml version="1.0" encoding="utf-8"?>
 <p:sld xmlns:a="http://schemas.openxmlformats.org/drawingml/2006/main" xmlns:r="http://schemas.openxmlformats.org/officeDocument/2006/relationships" xmlns:p="http://schemas.openxmlformats.org/presentationml/2006/main">
   <p:cSld>
     <p:spTree>
@@ -6878,238 +7115,6 @@
 </p:sld>
 </file>
 
-<file path=ppt/slides/slide14.xml><?xml version="1.0" encoding="utf-8"?>
-<p:sld xmlns:a="http://schemas.openxmlformats.org/drawingml/2006/main" xmlns:r="http://schemas.openxmlformats.org/officeDocument/2006/relationships" xmlns:p="http://schemas.openxmlformats.org/presentationml/2006/main">
-  <p:cSld>
-    <p:spTree>
-      <p:nvGrpSpPr>
-        <p:cNvPr id="1" name=""/>
-        <p:cNvGrpSpPr/>
-        <p:nvPr/>
-      </p:nvGrpSpPr>
-      <p:grpSpPr>
-        <a:xfrm>
-          <a:off x="0" y="0"/>
-          <a:ext cx="0" cy="0"/>
-          <a:chOff x="0" y="0"/>
-          <a:chExt cx="0" cy="0"/>
-        </a:xfrm>
-      </p:grpSpPr>
-      <p:sp>
-        <p:nvSpPr>
-          <p:cNvPr id="2" name="Title 1">
-            <a:extLst>
-              <a:ext uri="{FF2B5EF4-FFF2-40B4-BE49-F238E27FC236}">
-                <a16:creationId xmlns:a16="http://schemas.microsoft.com/office/drawing/2014/main" id="{D06E0C62-A6EE-4964-8122-4E6A1572BE6F}"/>
-              </a:ext>
-            </a:extLst>
-          </p:cNvPr>
-          <p:cNvSpPr>
-            <a:spLocks noGrp="1"/>
-          </p:cNvSpPr>
-          <p:nvPr>
-            <p:ph type="title"/>
-          </p:nvPr>
-        </p:nvSpPr>
-        <p:spPr/>
-        <p:txBody>
-          <a:bodyPr>
-            <a:normAutofit/>
-          </a:bodyPr>
-          <a:lstStyle/>
-          <a:p>
-            <a:r>
-              <a:rPr lang="en-US" sz="3600" dirty="0"/>
-              <a:t>Further notes and reference for .NET Core SDK and runtime version specific</a:t>
-            </a:r>
-          </a:p>
-        </p:txBody>
-      </p:sp>
-      <p:sp>
-        <p:nvSpPr>
-          <p:cNvPr id="3" name="Content Placeholder 2">
-            <a:extLst>
-              <a:ext uri="{FF2B5EF4-FFF2-40B4-BE49-F238E27FC236}">
-                <a16:creationId xmlns:a16="http://schemas.microsoft.com/office/drawing/2014/main" id="{26914C85-9A65-4E42-B45F-9372C77135E8}"/>
-              </a:ext>
-            </a:extLst>
-          </p:cNvPr>
-          <p:cNvSpPr>
-            <a:spLocks noGrp="1"/>
-          </p:cNvSpPr>
-          <p:nvPr>
-            <p:ph idx="1"/>
-          </p:nvPr>
-        </p:nvSpPr>
-        <p:spPr/>
-        <p:txBody>
-          <a:bodyPr>
-            <a:normAutofit lnSpcReduction="10000"/>
-          </a:bodyPr>
-          <a:lstStyle/>
-          <a:p>
-            <a:r>
-              <a:rPr lang="en-US" sz="2000" dirty="0"/>
-              <a:t>If you want to focus on runtime specific environment, use specific runtime version by adding this XML element inside your </a:t>
-            </a:r>
-            <a:r>
-              <a:rPr lang="en-US" sz="2000" dirty="0" err="1"/>
-              <a:t>csproj</a:t>
-            </a:r>
-            <a:r>
-              <a:rPr lang="en-US" sz="2000" dirty="0"/>
-              <a:t>: &lt;</a:t>
-            </a:r>
-            <a:r>
-              <a:rPr lang="en-US" sz="2000" dirty="0" err="1"/>
-              <a:t>RuntimeFrameworkVersion</a:t>
-            </a:r>
-            <a:r>
-              <a:rPr lang="en-US" sz="2000" dirty="0"/>
-              <a:t>&gt;. For example: </a:t>
-            </a:r>
-            <a:r>
-              <a:rPr lang="en-US" sz="2000" dirty="0">
-                <a:latin typeface="Consolas" panose="020B0609020204030204" pitchFamily="49" charset="0"/>
-              </a:rPr>
-              <a:t>&lt;</a:t>
-            </a:r>
-            <a:r>
-              <a:rPr lang="en-US" sz="2000" dirty="0" err="1">
-                <a:latin typeface="Consolas" panose="020B0609020204030204" pitchFamily="49" charset="0"/>
-              </a:rPr>
-              <a:t>RuntimeFrameworkVersion</a:t>
-            </a:r>
-            <a:r>
-              <a:rPr lang="en-US" sz="2000" dirty="0">
-                <a:latin typeface="Consolas" panose="020B0609020204030204" pitchFamily="49" charset="0"/>
-              </a:rPr>
-              <a:t>&gt;3.0.0&lt;/</a:t>
-            </a:r>
-            <a:r>
-              <a:rPr lang="en-US" sz="2000" dirty="0" err="1">
-                <a:latin typeface="Consolas" panose="020B0609020204030204" pitchFamily="49" charset="0"/>
-              </a:rPr>
-              <a:t>RuntimeFrameworkVersion</a:t>
-            </a:r>
-            <a:r>
-              <a:rPr lang="en-US" sz="2000" dirty="0">
-                <a:latin typeface="Consolas" panose="020B0609020204030204" pitchFamily="49" charset="0"/>
-              </a:rPr>
-              <a:t>&gt;</a:t>
-            </a:r>
-          </a:p>
-          <a:p>
-            <a:r>
-              <a:rPr lang="en-US" sz="2000" dirty="0"/>
-              <a:t>Do not mix the wrong SDK version in </a:t>
-            </a:r>
-            <a:r>
-              <a:rPr lang="en-US" sz="2000" dirty="0" err="1"/>
-              <a:t>global.json</a:t>
-            </a:r>
-            <a:r>
-              <a:rPr lang="en-US" sz="2000" dirty="0"/>
-              <a:t> with the runtime if you want to have both. For example: if the SDK use 3.0.100, then the runtime should only use the .NET Core runtime of version that is related or equal with the SDK release or previous but with the same 3.0.x version, such as 3.0.0 </a:t>
-            </a:r>
-            <a:r>
-              <a:rPr lang="en-US" sz="2000"/>
-              <a:t>or 3.0.1 </a:t>
-            </a:r>
-            <a:r>
-              <a:rPr lang="en-US" sz="2000" dirty="0"/>
-              <a:t>is still valid or compatible.</a:t>
-            </a:r>
-          </a:p>
-          <a:p>
-            <a:r>
-              <a:rPr lang="en-US" sz="2000" dirty="0"/>
-              <a:t>Refer to this official docs for use cases scenario: </a:t>
-            </a:r>
-            <a:r>
-              <a:rPr lang="en-US" sz="2000" dirty="0">
-                <a:hlinkClick r:id="rId2"/>
-              </a:rPr>
-              <a:t>https://docs.microsoft.com/en-us/dotnet/core/versions/selection</a:t>
-            </a:r>
-            <a:endParaRPr lang="en-US" sz="2000" dirty="0"/>
-          </a:p>
-          <a:p>
-            <a:endParaRPr lang="en-US" sz="2000" dirty="0"/>
-          </a:p>
-        </p:txBody>
-      </p:sp>
-    </p:spTree>
-    <p:extLst>
-      <p:ext uri="{BB962C8B-B14F-4D97-AF65-F5344CB8AC3E}">
-        <p14:creationId xmlns:p14="http://schemas.microsoft.com/office/powerpoint/2010/main" val="2418761112"/>
-      </p:ext>
-    </p:extLst>
-  </p:cSld>
-  <p:clrMapOvr>
-    <a:masterClrMapping/>
-  </p:clrMapOvr>
-</p:sld>
-</file>
-
-<file path=ppt/slides/slide15.xml><?xml version="1.0" encoding="utf-8"?>
-<p:sld xmlns:a="http://schemas.openxmlformats.org/drawingml/2006/main" xmlns:r="http://schemas.openxmlformats.org/officeDocument/2006/relationships" xmlns:p="http://schemas.openxmlformats.org/presentationml/2006/main">
-  <p:cSld>
-    <p:spTree>
-      <p:nvGrpSpPr>
-        <p:cNvPr id="1" name=""/>
-        <p:cNvGrpSpPr/>
-        <p:nvPr/>
-      </p:nvGrpSpPr>
-      <p:grpSpPr>
-        <a:xfrm>
-          <a:off x="0" y="0"/>
-          <a:ext cx="0" cy="0"/>
-          <a:chOff x="0" y="0"/>
-          <a:chExt cx="0" cy="0"/>
-        </a:xfrm>
-      </p:grpSpPr>
-      <p:sp>
-        <p:nvSpPr>
-          <p:cNvPr id="2" name="Title 1">
-            <a:extLst>
-              <a:ext uri="{FF2B5EF4-FFF2-40B4-BE49-F238E27FC236}">
-                <a16:creationId xmlns:a16="http://schemas.microsoft.com/office/drawing/2014/main" id="{C6C46B49-D9CC-42ED-B8DD-32F281C6CE27}"/>
-              </a:ext>
-            </a:extLst>
-          </p:cNvPr>
-          <p:cNvSpPr>
-            <a:spLocks noGrp="1"/>
-          </p:cNvSpPr>
-          <p:nvPr>
-            <p:ph type="title"/>
-          </p:nvPr>
-        </p:nvSpPr>
-        <p:spPr/>
-        <p:txBody>
-          <a:bodyPr/>
-          <a:lstStyle/>
-          <a:p>
-            <a:r>
-              <a:rPr lang="en-US" dirty="0"/>
-              <a:t>Demo on build locally</a:t>
-            </a:r>
-          </a:p>
-        </p:txBody>
-      </p:sp>
-    </p:spTree>
-    <p:extLst>
-      <p:ext uri="{BB962C8B-B14F-4D97-AF65-F5344CB8AC3E}">
-        <p14:creationId xmlns:p14="http://schemas.microsoft.com/office/powerpoint/2010/main" val="2343858251"/>
-      </p:ext>
-    </p:extLst>
-  </p:cSld>
-  <p:clrMapOvr>
-    <a:masterClrMapping/>
-  </p:clrMapOvr>
-</p:sld>
-</file>
-
 <file path=ppt/slides/slide16.xml><?xml version="1.0" encoding="utf-8"?>
 <p:sld xmlns:a="http://schemas.openxmlformats.org/drawingml/2006/main" xmlns:r="http://schemas.openxmlformats.org/officeDocument/2006/relationships" xmlns:p="http://schemas.openxmlformats.org/presentationml/2006/main">
   <p:cSld>
@@ -7132,7 +7137,7 @@
           <p:cNvPr id="2" name="Title 1">
             <a:extLst>
               <a:ext uri="{FF2B5EF4-FFF2-40B4-BE49-F238E27FC236}">
-                <a16:creationId xmlns:a16="http://schemas.microsoft.com/office/drawing/2014/main" id="{711382CC-E163-440B-A145-D738F90BE938}"/>
+                <a16:creationId xmlns:a16="http://schemas.microsoft.com/office/drawing/2014/main" id="{D06E0C62-A6EE-4964-8122-4E6A1572BE6F}"/>
               </a:ext>
             </a:extLst>
           </p:cNvPr>
@@ -7145,22 +7150,24 @@
         </p:nvSpPr>
         <p:spPr/>
         <p:txBody>
-          <a:bodyPr/>
-          <a:lstStyle/>
-          <a:p>
-            <a:r>
-              <a:rPr lang="en-US" dirty="0"/>
-              <a:t>Prepare and implement CI/CD on Azure DevOps</a:t>
-            </a:r>
-          </a:p>
-        </p:txBody>
-      </p:sp>
-      <p:sp>
-        <p:nvSpPr>
-          <p:cNvPr id="3" name="Text Placeholder 2">
+          <a:bodyPr>
+            <a:normAutofit/>
+          </a:bodyPr>
+          <a:lstStyle/>
+          <a:p>
+            <a:r>
+              <a:rPr lang="en-US" sz="3600" dirty="0"/>
+              <a:t>Further notes and reference for .NET Core SDK and runtime version specific</a:t>
+            </a:r>
+          </a:p>
+        </p:txBody>
+      </p:sp>
+      <p:sp>
+        <p:nvSpPr>
+          <p:cNvPr id="3" name="Content Placeholder 2">
             <a:extLst>
               <a:ext uri="{FF2B5EF4-FFF2-40B4-BE49-F238E27FC236}">
-                <a16:creationId xmlns:a16="http://schemas.microsoft.com/office/drawing/2014/main" id="{C15867EC-1FEE-4FFF-B8FE-1BB4F6F0D9FB}"/>
+                <a16:creationId xmlns:a16="http://schemas.microsoft.com/office/drawing/2014/main" id="{26914C85-9A65-4E42-B45F-9372C77135E8}"/>
               </a:ext>
             </a:extLst>
           </p:cNvPr>
@@ -7168,22 +7175,111 @@
             <a:spLocks noGrp="1"/>
           </p:cNvSpPr>
           <p:nvPr>
-            <p:ph type="body" idx="1"/>
-          </p:nvPr>
-        </p:nvSpPr>
-        <p:spPr/>
-        <p:txBody>
-          <a:bodyPr/>
-          <a:lstStyle/>
-          <a:p>
-            <a:endParaRPr lang="en-US"/>
+            <p:ph idx="1"/>
+          </p:nvPr>
+        </p:nvSpPr>
+        <p:spPr/>
+        <p:txBody>
+          <a:bodyPr>
+            <a:normAutofit lnSpcReduction="10000"/>
+          </a:bodyPr>
+          <a:lstStyle/>
+          <a:p>
+            <a:r>
+              <a:rPr lang="en-US" sz="2000" dirty="0"/>
+              <a:t>If you want to focus on runtime specific environment, use specific runtime version by adding this XML element inside your </a:t>
+            </a:r>
+            <a:r>
+              <a:rPr lang="en-US" sz="2000" dirty="0" err="1"/>
+              <a:t>csproj</a:t>
+            </a:r>
+            <a:r>
+              <a:rPr lang="en-US" sz="2000" dirty="0"/>
+              <a:t>: &lt;</a:t>
+            </a:r>
+            <a:r>
+              <a:rPr lang="en-US" sz="2000" dirty="0" err="1"/>
+              <a:t>RuntimeFrameworkVersion</a:t>
+            </a:r>
+            <a:r>
+              <a:rPr lang="en-US" sz="2000" dirty="0"/>
+              <a:t>&gt;. For example: </a:t>
+            </a:r>
+            <a:r>
+              <a:rPr lang="en-US" sz="2000" dirty="0">
+                <a:latin typeface="Consolas" panose="020B0609020204030204" pitchFamily="49" charset="0"/>
+              </a:rPr>
+              <a:t>&lt;</a:t>
+            </a:r>
+            <a:r>
+              <a:rPr lang="en-US" sz="2000" dirty="0" err="1">
+                <a:latin typeface="Consolas" panose="020B0609020204030204" pitchFamily="49" charset="0"/>
+              </a:rPr>
+              <a:t>RuntimeFrameworkVersion</a:t>
+            </a:r>
+            <a:r>
+              <a:rPr lang="en-US" sz="2000" dirty="0">
+                <a:latin typeface="Consolas" panose="020B0609020204030204" pitchFamily="49" charset="0"/>
+              </a:rPr>
+              <a:t>&gt;3.0.0&lt;/</a:t>
+            </a:r>
+            <a:r>
+              <a:rPr lang="en-US" sz="2000" dirty="0" err="1">
+                <a:latin typeface="Consolas" panose="020B0609020204030204" pitchFamily="49" charset="0"/>
+              </a:rPr>
+              <a:t>RuntimeFrameworkVersion</a:t>
+            </a:r>
+            <a:r>
+              <a:rPr lang="en-US" sz="2000" dirty="0">
+                <a:latin typeface="Consolas" panose="020B0609020204030204" pitchFamily="49" charset="0"/>
+              </a:rPr>
+              <a:t>&gt;</a:t>
+            </a:r>
+          </a:p>
+          <a:p>
+            <a:r>
+              <a:rPr lang="en-US" sz="2000" dirty="0"/>
+              <a:t>Do not mix the wrong SDK version in </a:t>
+            </a:r>
+            <a:r>
+              <a:rPr lang="en-US" sz="2000" dirty="0" err="1"/>
+              <a:t>global.json</a:t>
+            </a:r>
+            <a:r>
+              <a:rPr lang="en-US" sz="2000" dirty="0"/>
+              <a:t> with the runtime if you want to have both. For example: if the SDK use 3.0.100, then the runtime should only use the .NET Core runtime of version that is related or equal with the SDK release or previous but with the same 3.0.x version, such as 3.0.0 </a:t>
+            </a:r>
+            <a:r>
+              <a:rPr lang="en-US" sz="2000"/>
+              <a:t>or 3.0.1 </a:t>
+            </a:r>
+            <a:r>
+              <a:rPr lang="en-US" sz="2000" dirty="0"/>
+              <a:t>is still valid or compatible.</a:t>
+            </a:r>
+          </a:p>
+          <a:p>
+            <a:r>
+              <a:rPr lang="en-US" sz="2000" dirty="0"/>
+              <a:t>Refer to this official docs for use cases scenario: </a:t>
+            </a:r>
+            <a:r>
+              <a:rPr lang="en-US" sz="2000" dirty="0">
+                <a:hlinkClick r:id="rId2"/>
+              </a:rPr>
+              <a:t>https://docs.microsoft.com/en-us/dotnet/core/versions/selection</a:t>
+            </a:r>
+            <a:endParaRPr lang="en-US" sz="2000" dirty="0"/>
+          </a:p>
+          <a:p>
+            <a:endParaRPr lang="en-US" sz="2000" dirty="0"/>
           </a:p>
         </p:txBody>
       </p:sp>
     </p:spTree>
     <p:extLst>
       <p:ext uri="{BB962C8B-B14F-4D97-AF65-F5344CB8AC3E}">
-        <p14:creationId xmlns:p14="http://schemas.microsoft.com/office/powerpoint/2010/main" val="518272309"/>
+        <p14:creationId xmlns:p14="http://schemas.microsoft.com/office/powerpoint/2010/main" val="2418761112"/>
       </p:ext>
     </p:extLst>
   </p:cSld>
@@ -7215,7 +7311,7 @@
           <p:cNvPr id="2" name="Title 1">
             <a:extLst>
               <a:ext uri="{FF2B5EF4-FFF2-40B4-BE49-F238E27FC236}">
-                <a16:creationId xmlns:a16="http://schemas.microsoft.com/office/drawing/2014/main" id="{C27F5F88-85DE-4846-A089-FE5224987710}"/>
+                <a16:creationId xmlns:a16="http://schemas.microsoft.com/office/drawing/2014/main" id="{C6C46B49-D9CC-42ED-B8DD-32F281C6CE27}"/>
               </a:ext>
             </a:extLst>
           </p:cNvPr>
@@ -7228,64 +7324,12 @@
         </p:nvSpPr>
         <p:spPr/>
         <p:txBody>
-          <a:bodyPr>
-            <a:normAutofit/>
-          </a:bodyPr>
-          <a:lstStyle/>
-          <a:p>
-            <a:r>
-              <a:rPr lang="en-US" sz="3200" dirty="0"/>
-              <a:t>Guidelines on implementing .NET Core 2.x CI on Azure DevOps</a:t>
-            </a:r>
-          </a:p>
-        </p:txBody>
-      </p:sp>
-      <p:sp>
-        <p:nvSpPr>
-          <p:cNvPr id="3" name="Content Placeholder 2">
-            <a:extLst>
-              <a:ext uri="{FF2B5EF4-FFF2-40B4-BE49-F238E27FC236}">
-                <a16:creationId xmlns:a16="http://schemas.microsoft.com/office/drawing/2014/main" id="{E840614A-640B-4ECD-A14A-2D06F68B478C}"/>
-              </a:ext>
-            </a:extLst>
-          </p:cNvPr>
-          <p:cNvSpPr>
-            <a:spLocks noGrp="1"/>
-          </p:cNvSpPr>
-          <p:nvPr>
-            <p:ph idx="1"/>
-          </p:nvPr>
-        </p:nvSpPr>
-        <p:spPr/>
-        <p:txBody>
-          <a:bodyPr>
-            <a:normAutofit fontScale="92500" lnSpcReduction="10000"/>
-          </a:bodyPr>
+          <a:bodyPr/>
           <a:lstStyle/>
           <a:p>
             <a:r>
               <a:rPr lang="en-US" dirty="0"/>
-              <a:t>Use YAML whenever possible. Pros: greater control on what’s going on. Cons: learning curve of migrating from build designer habit.</a:t>
-            </a:r>
-          </a:p>
-          <a:p>
-            <a:r>
-              <a:rPr lang="en-US" dirty="0"/>
-              <a:t>Use Visual Studio related agent. On Azure DevOps Pipeline, there are three agent that focus on having Visual Studio installation: VS2015, VS2017 on Windows 2016, and VS2019 on Windows 2019 (currently in </a:t>
-            </a:r>
-            <a:r>
-              <a:rPr lang="en-US" i="1" dirty="0"/>
-              <a:t>Preview</a:t>
-            </a:r>
-            <a:r>
-              <a:rPr lang="en-US" dirty="0"/>
-              <a:t>). We must focus on VS2017 and later instead, for .NET Core 2.x.</a:t>
-            </a:r>
-          </a:p>
-          <a:p>
-            <a:r>
-              <a:rPr lang="en-US" dirty="0"/>
-              <a:t>Create CI first (with unit test support whenever possible) before creating CD, and ensure that the CI environment meets your development environment and configurations</a:t>
+              <a:t>Demo on build locally</a:t>
             </a:r>
           </a:p>
         </p:txBody>
@@ -7293,7 +7337,7 @@
     </p:spTree>
     <p:extLst>
       <p:ext uri="{BB962C8B-B14F-4D97-AF65-F5344CB8AC3E}">
-        <p14:creationId xmlns:p14="http://schemas.microsoft.com/office/powerpoint/2010/main" val="927352581"/>
+        <p14:creationId xmlns:p14="http://schemas.microsoft.com/office/powerpoint/2010/main" val="2343858251"/>
       </p:ext>
     </p:extLst>
   </p:cSld>
@@ -7325,7 +7369,7 @@
           <p:cNvPr id="2" name="Title 1">
             <a:extLst>
               <a:ext uri="{FF2B5EF4-FFF2-40B4-BE49-F238E27FC236}">
-                <a16:creationId xmlns:a16="http://schemas.microsoft.com/office/drawing/2014/main" id="{18D04155-4396-4787-B5E4-DB55C8CDAEF7}"/>
+                <a16:creationId xmlns:a16="http://schemas.microsoft.com/office/drawing/2014/main" id="{711382CC-E163-440B-A145-D738F90BE938}"/>
               </a:ext>
             </a:extLst>
           </p:cNvPr>
@@ -7343,17 +7387,17 @@
           <a:p>
             <a:r>
               <a:rPr lang="en-US" dirty="0"/>
-              <a:t>Notes on Azure DevOps YAML</a:t>
-            </a:r>
-          </a:p>
-        </p:txBody>
-      </p:sp>
-      <p:sp>
-        <p:nvSpPr>
-          <p:cNvPr id="3" name="Content Placeholder 2">
+              <a:t>Prepare and implement CI/CD on Azure DevOps</a:t>
+            </a:r>
+          </a:p>
+        </p:txBody>
+      </p:sp>
+      <p:sp>
+        <p:nvSpPr>
+          <p:cNvPr id="3" name="Text Placeholder 2">
             <a:extLst>
               <a:ext uri="{FF2B5EF4-FFF2-40B4-BE49-F238E27FC236}">
-                <a16:creationId xmlns:a16="http://schemas.microsoft.com/office/drawing/2014/main" id="{4F17C6FE-2CA0-4368-9680-1D64492AEEDF}"/>
+                <a16:creationId xmlns:a16="http://schemas.microsoft.com/office/drawing/2014/main" id="{C15867EC-1FEE-4FFF-B8FE-1BB4F6F0D9FB}"/>
               </a:ext>
             </a:extLst>
           </p:cNvPr>
@@ -7361,39 +7405,22 @@
             <a:spLocks noGrp="1"/>
           </p:cNvSpPr>
           <p:nvPr>
-            <p:ph idx="1"/>
-          </p:nvPr>
-        </p:nvSpPr>
-        <p:spPr/>
-        <p:txBody>
-          <a:bodyPr>
-            <a:normAutofit lnSpcReduction="10000"/>
-          </a:bodyPr>
-          <a:lstStyle/>
-          <a:p>
-            <a:r>
-              <a:rPr lang="en-US" dirty="0"/>
-              <a:t>Main focus is to be used in Azure Pipelines build (as CI)</a:t>
-            </a:r>
-          </a:p>
-          <a:p>
-            <a:r>
-              <a:rPr lang="en-US" dirty="0"/>
-              <a:t>Support multiple jobs in one YAML file, and each job can use different agent. It is strongly recommended to have multiple job if we are going to have support for different OS/platform, such as VS 2017 on Windows and Linux to ensure and check that we won’t break the build before doing deployment.</a:t>
-            </a:r>
-          </a:p>
-          <a:p>
-            <a:r>
-              <a:rPr lang="en-US" dirty="0"/>
-              <a:t>Having multiple jobs in one YAML can be used to effectively use the default free build hours if we need to do other things especially if we want to have environment checks before doing the actual build.</a:t>
-            </a:r>
+            <p:ph type="body" idx="1"/>
+          </p:nvPr>
+        </p:nvSpPr>
+        <p:spPr/>
+        <p:txBody>
+          <a:bodyPr/>
+          <a:lstStyle/>
+          <a:p>
+            <a:endParaRPr lang="en-US"/>
           </a:p>
         </p:txBody>
       </p:sp>
     </p:spTree>
     <p:extLst>
       <p:ext uri="{BB962C8B-B14F-4D97-AF65-F5344CB8AC3E}">
-        <p14:creationId xmlns:p14="http://schemas.microsoft.com/office/powerpoint/2010/main" val="4153715643"/>
+        <p14:creationId xmlns:p14="http://schemas.microsoft.com/office/powerpoint/2010/main" val="518272309"/>
       </p:ext>
     </p:extLst>
   </p:cSld>
@@ -7425,7 +7452,7 @@
           <p:cNvPr id="2" name="Title 1">
             <a:extLst>
               <a:ext uri="{FF2B5EF4-FFF2-40B4-BE49-F238E27FC236}">
-                <a16:creationId xmlns:a16="http://schemas.microsoft.com/office/drawing/2014/main" id="{858F7EAB-63A7-47AE-9D68-D30F3BBCE83D}"/>
+                <a16:creationId xmlns:a16="http://schemas.microsoft.com/office/drawing/2014/main" id="{C27F5F88-85DE-4846-A089-FE5224987710}"/>
               </a:ext>
             </a:extLst>
           </p:cNvPr>
@@ -7438,22 +7465,24 @@
         </p:nvSpPr>
         <p:spPr/>
         <p:txBody>
-          <a:bodyPr/>
-          <a:lstStyle/>
-          <a:p>
-            <a:r>
-              <a:rPr lang="en-US" dirty="0"/>
-              <a:t>DOs and DON’Ts of Azure DevOps Pipelines</a:t>
-            </a:r>
-          </a:p>
-        </p:txBody>
-      </p:sp>
-      <p:sp>
-        <p:nvSpPr>
-          <p:cNvPr id="3" name="Text Placeholder 2">
+          <a:bodyPr>
+            <a:normAutofit/>
+          </a:bodyPr>
+          <a:lstStyle/>
+          <a:p>
+            <a:r>
+              <a:rPr lang="en-US" sz="3200" dirty="0"/>
+              <a:t>Guidelines on implementing .NET Core 2.x CI on Azure DevOps</a:t>
+            </a:r>
+          </a:p>
+        </p:txBody>
+      </p:sp>
+      <p:sp>
+        <p:nvSpPr>
+          <p:cNvPr id="3" name="Content Placeholder 2">
             <a:extLst>
               <a:ext uri="{FF2B5EF4-FFF2-40B4-BE49-F238E27FC236}">
-                <a16:creationId xmlns:a16="http://schemas.microsoft.com/office/drawing/2014/main" id="{33F84BF9-AA63-4569-A740-62607F0FCFF9}"/>
+                <a16:creationId xmlns:a16="http://schemas.microsoft.com/office/drawing/2014/main" id="{E840614A-640B-4ECD-A14A-2D06F68B478C}"/>
               </a:ext>
             </a:extLst>
           </p:cNvPr>
@@ -7461,22 +7490,47 @@
             <a:spLocks noGrp="1"/>
           </p:cNvSpPr>
           <p:nvPr>
-            <p:ph type="body" idx="1"/>
-          </p:nvPr>
-        </p:nvSpPr>
-        <p:spPr/>
-        <p:txBody>
-          <a:bodyPr/>
-          <a:lstStyle/>
-          <a:p>
-            <a:endParaRPr lang="en-US"/>
+            <p:ph idx="1"/>
+          </p:nvPr>
+        </p:nvSpPr>
+        <p:spPr/>
+        <p:txBody>
+          <a:bodyPr>
+            <a:normAutofit fontScale="92500" lnSpcReduction="10000"/>
+          </a:bodyPr>
+          <a:lstStyle/>
+          <a:p>
+            <a:r>
+              <a:rPr lang="en-US" dirty="0"/>
+              <a:t>Use YAML whenever possible. Pros: greater control on what’s going on. Cons: learning curve of migrating from build designer habit.</a:t>
+            </a:r>
+          </a:p>
+          <a:p>
+            <a:r>
+              <a:rPr lang="en-US" dirty="0"/>
+              <a:t>Use Visual Studio related agent. On Azure DevOps Pipeline, there are three agent that focus on having Visual Studio installation: VS2015, VS2017 on Windows 2016, and VS2019 on Windows 2019 (currently in </a:t>
+            </a:r>
+            <a:r>
+              <a:rPr lang="en-US" i="1" dirty="0"/>
+              <a:t>Preview</a:t>
+            </a:r>
+            <a:r>
+              <a:rPr lang="en-US" dirty="0"/>
+              <a:t>). We must focus on VS2017 and later instead, for .NET Core 2.x.</a:t>
+            </a:r>
+          </a:p>
+          <a:p>
+            <a:r>
+              <a:rPr lang="en-US" dirty="0"/>
+              <a:t>Create CI first (with unit test support whenever possible) before creating CD, and ensure that the CI environment meets your development environment and configurations</a:t>
+            </a:r>
           </a:p>
         </p:txBody>
       </p:sp>
     </p:spTree>
     <p:extLst>
       <p:ext uri="{BB962C8B-B14F-4D97-AF65-F5344CB8AC3E}">
-        <p14:creationId xmlns:p14="http://schemas.microsoft.com/office/powerpoint/2010/main" val="1487450009"/>
+        <p14:creationId xmlns:p14="http://schemas.microsoft.com/office/powerpoint/2010/main" val="927352581"/>
       </p:ext>
     </p:extLst>
   </p:cSld>
@@ -7655,7 +7709,7 @@
           <p:cNvPr id="2" name="Title 1">
             <a:extLst>
               <a:ext uri="{FF2B5EF4-FFF2-40B4-BE49-F238E27FC236}">
-                <a16:creationId xmlns:a16="http://schemas.microsoft.com/office/drawing/2014/main" id="{8D1545FD-B9DD-48DF-B97A-E9447CA4B119}"/>
+                <a16:creationId xmlns:a16="http://schemas.microsoft.com/office/drawing/2014/main" id="{18D04155-4396-4787-B5E4-DB55C8CDAEF7}"/>
               </a:ext>
             </a:extLst>
           </p:cNvPr>
@@ -7673,7 +7727,7 @@
           <a:p>
             <a:r>
               <a:rPr lang="en-US" dirty="0"/>
-              <a:t>DO these in Azure DevOps Pipelines</a:t>
+              <a:t>Notes on Azure DevOps YAML</a:t>
             </a:r>
           </a:p>
         </p:txBody>
@@ -7683,7 +7737,7 @@
           <p:cNvPr id="3" name="Content Placeholder 2">
             <a:extLst>
               <a:ext uri="{FF2B5EF4-FFF2-40B4-BE49-F238E27FC236}">
-                <a16:creationId xmlns:a16="http://schemas.microsoft.com/office/drawing/2014/main" id="{8956CE6D-6930-4C77-A403-DB73004B2C28}"/>
+                <a16:creationId xmlns:a16="http://schemas.microsoft.com/office/drawing/2014/main" id="{4F17C6FE-2CA0-4368-9680-1D64492AEEDF}"/>
               </a:ext>
             </a:extLst>
           </p:cNvPr>
@@ -7697,60 +7751,33 @@
         <p:spPr/>
         <p:txBody>
           <a:bodyPr>
-            <a:normAutofit fontScale="92500" lnSpcReduction="20000"/>
+            <a:normAutofit lnSpcReduction="10000"/>
           </a:bodyPr>
           <a:lstStyle/>
           <a:p>
             <a:r>
               <a:rPr lang="en-US" dirty="0"/>
-              <a:t>Always check for the agent installed SDK specification and its runtime</a:t>
+              <a:t>Main focus is to be used in Azure Pipelines build (as CI)</a:t>
             </a:r>
           </a:p>
           <a:p>
             <a:r>
               <a:rPr lang="en-US" dirty="0"/>
-              <a:t>Watch for any changes in the state of installed SDK, especially .NET Core SDK.</a:t>
+              <a:t>Support multiple jobs in one YAML file, and each job can use different agent. It is strongly recommended to have multiple job if we are going to have support for different OS/platform, such as VS 2017 on Windows and Linux to ensure and check that we won’t break the build before doing deployment.</a:t>
             </a:r>
           </a:p>
           <a:p>
             <a:r>
               <a:rPr lang="en-US" dirty="0"/>
-              <a:t>For more detail, check the actual version of the installed SDK by looking at the repo of Azure Pipeline agent image on GitHub: </a:t>
-            </a:r>
-            <a:r>
-              <a:rPr lang="en-US" dirty="0">
-                <a:hlinkClick r:id="rId2"/>
-              </a:rPr>
-              <a:t>https://github.com/Microsoft/azure-pipelines-image-generation</a:t>
-            </a:r>
-            <a:endParaRPr lang="en-US" dirty="0"/>
-          </a:p>
-          <a:p>
-            <a:r>
-              <a:rPr lang="en-US" dirty="0"/>
-              <a:t>Always check for installed VS 2017 version on the agent, at least on the installed </a:t>
-            </a:r>
-            <a:r>
-              <a:rPr lang="en-US" dirty="0" err="1"/>
-              <a:t>MSBuild</a:t>
-            </a:r>
-            <a:endParaRPr lang="en-US" dirty="0"/>
-          </a:p>
-          <a:p>
-            <a:r>
-              <a:rPr lang="en-US" dirty="0"/>
-              <a:t>Watch for agent deprecations</a:t>
-            </a:r>
-          </a:p>
-          <a:p>
-            <a:endParaRPr lang="en-US" dirty="0"/>
+              <a:t>Having multiple jobs in one YAML can be used to effectively use the default free build hours if we need to do other things especially if we want to have environment checks before doing the actual build.</a:t>
+            </a:r>
           </a:p>
         </p:txBody>
       </p:sp>
     </p:spTree>
     <p:extLst>
       <p:ext uri="{BB962C8B-B14F-4D97-AF65-F5344CB8AC3E}">
-        <p14:creationId xmlns:p14="http://schemas.microsoft.com/office/powerpoint/2010/main" val="730783858"/>
+        <p14:creationId xmlns:p14="http://schemas.microsoft.com/office/powerpoint/2010/main" val="4153715643"/>
       </p:ext>
     </p:extLst>
   </p:cSld>
@@ -7782,7 +7809,7 @@
           <p:cNvPr id="2" name="Title 1">
             <a:extLst>
               <a:ext uri="{FF2B5EF4-FFF2-40B4-BE49-F238E27FC236}">
-                <a16:creationId xmlns:a16="http://schemas.microsoft.com/office/drawing/2014/main" id="{DCEF8A52-E672-415C-AEE3-D76F5F3B7C39}"/>
+                <a16:creationId xmlns:a16="http://schemas.microsoft.com/office/drawing/2014/main" id="{858F7EAB-63A7-47AE-9D68-D30F3BBCE83D}"/>
               </a:ext>
             </a:extLst>
           </p:cNvPr>
@@ -7800,17 +7827,17 @@
           <a:p>
             <a:r>
               <a:rPr lang="en-US" dirty="0"/>
-              <a:t>Optional DOs for Azure DevOps</a:t>
-            </a:r>
-          </a:p>
-        </p:txBody>
-      </p:sp>
-      <p:sp>
-        <p:nvSpPr>
-          <p:cNvPr id="3" name="Content Placeholder 2">
+              <a:t>DOs and DON’Ts of Azure DevOps Pipelines</a:t>
+            </a:r>
+          </a:p>
+        </p:txBody>
+      </p:sp>
+      <p:sp>
+        <p:nvSpPr>
+          <p:cNvPr id="3" name="Text Placeholder 2">
             <a:extLst>
               <a:ext uri="{FF2B5EF4-FFF2-40B4-BE49-F238E27FC236}">
-                <a16:creationId xmlns:a16="http://schemas.microsoft.com/office/drawing/2014/main" id="{352784B2-996C-43C1-84BA-771D02D647F5}"/>
+                <a16:creationId xmlns:a16="http://schemas.microsoft.com/office/drawing/2014/main" id="{33F84BF9-AA63-4569-A740-62607F0FCFF9}"/>
               </a:ext>
             </a:extLst>
           </p:cNvPr>
@@ -7818,7 +7845,7 @@
             <a:spLocks noGrp="1"/>
           </p:cNvSpPr>
           <p:nvPr>
-            <p:ph idx="1"/>
+            <p:ph type="body" idx="1"/>
           </p:nvPr>
         </p:nvSpPr>
         <p:spPr/>
@@ -7826,17 +7853,14 @@
           <a:bodyPr/>
           <a:lstStyle/>
           <a:p>
-            <a:r>
-              <a:rPr lang="en-US" dirty="0"/>
-              <a:t>If you use Azure Repo and Git, opt in to use GVFS (Git Virtual File System) to leverage optimized git flows for repo with many files (more than 1M files) and many branches (more than 1K branches) that has total cloned size of more than 1GB. See </a:t>
-            </a:r>
+            <a:endParaRPr lang="en-US"/>
           </a:p>
         </p:txBody>
       </p:sp>
     </p:spTree>
     <p:extLst>
       <p:ext uri="{BB962C8B-B14F-4D97-AF65-F5344CB8AC3E}">
-        <p14:creationId xmlns:p14="http://schemas.microsoft.com/office/powerpoint/2010/main" val="2178054305"/>
+        <p14:creationId xmlns:p14="http://schemas.microsoft.com/office/powerpoint/2010/main" val="1487450009"/>
       </p:ext>
     </p:extLst>
   </p:cSld>
@@ -7868,6 +7892,219 @@
           <p:cNvPr id="2" name="Title 1">
             <a:extLst>
               <a:ext uri="{FF2B5EF4-FFF2-40B4-BE49-F238E27FC236}">
+                <a16:creationId xmlns:a16="http://schemas.microsoft.com/office/drawing/2014/main" id="{8D1545FD-B9DD-48DF-B97A-E9447CA4B119}"/>
+              </a:ext>
+            </a:extLst>
+          </p:cNvPr>
+          <p:cNvSpPr>
+            <a:spLocks noGrp="1"/>
+          </p:cNvSpPr>
+          <p:nvPr>
+            <p:ph type="title"/>
+          </p:nvPr>
+        </p:nvSpPr>
+        <p:spPr/>
+        <p:txBody>
+          <a:bodyPr/>
+          <a:lstStyle/>
+          <a:p>
+            <a:r>
+              <a:rPr lang="en-US" dirty="0"/>
+              <a:t>DO these in Azure DevOps Pipelines</a:t>
+            </a:r>
+          </a:p>
+        </p:txBody>
+      </p:sp>
+      <p:sp>
+        <p:nvSpPr>
+          <p:cNvPr id="3" name="Content Placeholder 2">
+            <a:extLst>
+              <a:ext uri="{FF2B5EF4-FFF2-40B4-BE49-F238E27FC236}">
+                <a16:creationId xmlns:a16="http://schemas.microsoft.com/office/drawing/2014/main" id="{8956CE6D-6930-4C77-A403-DB73004B2C28}"/>
+              </a:ext>
+            </a:extLst>
+          </p:cNvPr>
+          <p:cNvSpPr>
+            <a:spLocks noGrp="1"/>
+          </p:cNvSpPr>
+          <p:nvPr>
+            <p:ph idx="1"/>
+          </p:nvPr>
+        </p:nvSpPr>
+        <p:spPr/>
+        <p:txBody>
+          <a:bodyPr>
+            <a:normAutofit fontScale="92500" lnSpcReduction="20000"/>
+          </a:bodyPr>
+          <a:lstStyle/>
+          <a:p>
+            <a:r>
+              <a:rPr lang="en-US" dirty="0"/>
+              <a:t>Always check for the agent installed SDK specification and its runtime</a:t>
+            </a:r>
+          </a:p>
+          <a:p>
+            <a:r>
+              <a:rPr lang="en-US" dirty="0"/>
+              <a:t>Watch for any changes in the state of installed SDK, especially .NET Core SDK.</a:t>
+            </a:r>
+          </a:p>
+          <a:p>
+            <a:r>
+              <a:rPr lang="en-US" dirty="0"/>
+              <a:t>For more detail, check the actual version of the installed SDK by looking at the repo of Azure Pipeline agent image on GitHub: </a:t>
+            </a:r>
+            <a:r>
+              <a:rPr lang="en-US" dirty="0">
+                <a:hlinkClick r:id="rId2"/>
+              </a:rPr>
+              <a:t>https://github.com/Microsoft/azure-pipelines-image-generation</a:t>
+            </a:r>
+            <a:endParaRPr lang="en-US" dirty="0"/>
+          </a:p>
+          <a:p>
+            <a:r>
+              <a:rPr lang="en-US" dirty="0"/>
+              <a:t>Always check for installed VS 2017 version on the agent, at least on the installed </a:t>
+            </a:r>
+            <a:r>
+              <a:rPr lang="en-US" dirty="0" err="1"/>
+              <a:t>MSBuild</a:t>
+            </a:r>
+            <a:endParaRPr lang="en-US" dirty="0"/>
+          </a:p>
+          <a:p>
+            <a:r>
+              <a:rPr lang="en-US" dirty="0"/>
+              <a:t>Watch for agent deprecations</a:t>
+            </a:r>
+          </a:p>
+          <a:p>
+            <a:endParaRPr lang="en-US" dirty="0"/>
+          </a:p>
+        </p:txBody>
+      </p:sp>
+    </p:spTree>
+    <p:extLst>
+      <p:ext uri="{BB962C8B-B14F-4D97-AF65-F5344CB8AC3E}">
+        <p14:creationId xmlns:p14="http://schemas.microsoft.com/office/powerpoint/2010/main" val="730783858"/>
+      </p:ext>
+    </p:extLst>
+  </p:cSld>
+  <p:clrMapOvr>
+    <a:masterClrMapping/>
+  </p:clrMapOvr>
+</p:sld>
+</file>
+
+<file path=ppt/slides/slide23.xml><?xml version="1.0" encoding="utf-8"?>
+<p:sld xmlns:a="http://schemas.openxmlformats.org/drawingml/2006/main" xmlns:r="http://schemas.openxmlformats.org/officeDocument/2006/relationships" xmlns:p="http://schemas.openxmlformats.org/presentationml/2006/main">
+  <p:cSld>
+    <p:spTree>
+      <p:nvGrpSpPr>
+        <p:cNvPr id="1" name=""/>
+        <p:cNvGrpSpPr/>
+        <p:nvPr/>
+      </p:nvGrpSpPr>
+      <p:grpSpPr>
+        <a:xfrm>
+          <a:off x="0" y="0"/>
+          <a:ext cx="0" cy="0"/>
+          <a:chOff x="0" y="0"/>
+          <a:chExt cx="0" cy="0"/>
+        </a:xfrm>
+      </p:grpSpPr>
+      <p:sp>
+        <p:nvSpPr>
+          <p:cNvPr id="2" name="Title 1">
+            <a:extLst>
+              <a:ext uri="{FF2B5EF4-FFF2-40B4-BE49-F238E27FC236}">
+                <a16:creationId xmlns:a16="http://schemas.microsoft.com/office/drawing/2014/main" id="{DCEF8A52-E672-415C-AEE3-D76F5F3B7C39}"/>
+              </a:ext>
+            </a:extLst>
+          </p:cNvPr>
+          <p:cNvSpPr>
+            <a:spLocks noGrp="1"/>
+          </p:cNvSpPr>
+          <p:nvPr>
+            <p:ph type="title"/>
+          </p:nvPr>
+        </p:nvSpPr>
+        <p:spPr/>
+        <p:txBody>
+          <a:bodyPr/>
+          <a:lstStyle/>
+          <a:p>
+            <a:r>
+              <a:rPr lang="en-US" dirty="0"/>
+              <a:t>Optional DOs for Azure DevOps</a:t>
+            </a:r>
+          </a:p>
+        </p:txBody>
+      </p:sp>
+      <p:sp>
+        <p:nvSpPr>
+          <p:cNvPr id="3" name="Content Placeholder 2">
+            <a:extLst>
+              <a:ext uri="{FF2B5EF4-FFF2-40B4-BE49-F238E27FC236}">
+                <a16:creationId xmlns:a16="http://schemas.microsoft.com/office/drawing/2014/main" id="{352784B2-996C-43C1-84BA-771D02D647F5}"/>
+              </a:ext>
+            </a:extLst>
+          </p:cNvPr>
+          <p:cNvSpPr>
+            <a:spLocks noGrp="1"/>
+          </p:cNvSpPr>
+          <p:nvPr>
+            <p:ph idx="1"/>
+          </p:nvPr>
+        </p:nvSpPr>
+        <p:spPr/>
+        <p:txBody>
+          <a:bodyPr/>
+          <a:lstStyle/>
+          <a:p>
+            <a:r>
+              <a:rPr lang="en-US" dirty="0"/>
+              <a:t>If you use Azure Repo and Git, opt in to use GVFS (Git Virtual File System) to leverage optimized git flows for repo with many files (more than 1M files) and many branches (more than 1K branches) that has total cloned size of more than 1GB. See </a:t>
+            </a:r>
+          </a:p>
+        </p:txBody>
+      </p:sp>
+    </p:spTree>
+    <p:extLst>
+      <p:ext uri="{BB962C8B-B14F-4D97-AF65-F5344CB8AC3E}">
+        <p14:creationId xmlns:p14="http://schemas.microsoft.com/office/powerpoint/2010/main" val="2178054305"/>
+      </p:ext>
+    </p:extLst>
+  </p:cSld>
+  <p:clrMapOvr>
+    <a:masterClrMapping/>
+  </p:clrMapOvr>
+</p:sld>
+</file>
+
+<file path=ppt/slides/slide24.xml><?xml version="1.0" encoding="utf-8"?>
+<p:sld xmlns:a="http://schemas.openxmlformats.org/drawingml/2006/main" xmlns:r="http://schemas.openxmlformats.org/officeDocument/2006/relationships" xmlns:p="http://schemas.openxmlformats.org/presentationml/2006/main">
+  <p:cSld>
+    <p:spTree>
+      <p:nvGrpSpPr>
+        <p:cNvPr id="1" name=""/>
+        <p:cNvGrpSpPr/>
+        <p:nvPr/>
+      </p:nvGrpSpPr>
+      <p:grpSpPr>
+        <a:xfrm>
+          <a:off x="0" y="0"/>
+          <a:ext cx="0" cy="0"/>
+          <a:chOff x="0" y="0"/>
+          <a:chExt cx="0" cy="0"/>
+        </a:xfrm>
+      </p:grpSpPr>
+      <p:sp>
+        <p:nvSpPr>
+          <p:cNvPr id="2" name="Title 1">
+            <a:extLst>
+              <a:ext uri="{FF2B5EF4-FFF2-40B4-BE49-F238E27FC236}">
                 <a16:creationId xmlns:a16="http://schemas.microsoft.com/office/drawing/2014/main" id="{B7DC7285-A25A-410A-9A6F-B83C3483765F}"/>
               </a:ext>
             </a:extLst>
@@ -7968,7 +8205,133 @@
 </p:sld>
 </file>
 
-<file path=ppt/slides/slide23.xml><?xml version="1.0" encoding="utf-8"?>
+<file path=ppt/slides/slide25.xml><?xml version="1.0" encoding="utf-8"?>
+<p:sld xmlns:a="http://schemas.openxmlformats.org/drawingml/2006/main" xmlns:r="http://schemas.openxmlformats.org/officeDocument/2006/relationships" xmlns:p="http://schemas.openxmlformats.org/presentationml/2006/main">
+  <p:cSld>
+    <p:spTree>
+      <p:nvGrpSpPr>
+        <p:cNvPr id="1" name=""/>
+        <p:cNvGrpSpPr/>
+        <p:nvPr/>
+      </p:nvGrpSpPr>
+      <p:grpSpPr>
+        <a:xfrm>
+          <a:off x="0" y="0"/>
+          <a:ext cx="0" cy="0"/>
+          <a:chOff x="0" y="0"/>
+          <a:chExt cx="0" cy="0"/>
+        </a:xfrm>
+      </p:grpSpPr>
+      <p:sp>
+        <p:nvSpPr>
+          <p:cNvPr id="2" name="Title 1">
+            <a:extLst>
+              <a:ext uri="{FF2B5EF4-FFF2-40B4-BE49-F238E27FC236}">
+                <a16:creationId xmlns:a16="http://schemas.microsoft.com/office/drawing/2014/main" id="{7C802EC6-5E82-49DD-90AB-8CDE334332BD}"/>
+              </a:ext>
+            </a:extLst>
+          </p:cNvPr>
+          <p:cNvSpPr>
+            <a:spLocks noGrp="1"/>
+          </p:cNvSpPr>
+          <p:nvPr>
+            <p:ph type="title"/>
+          </p:nvPr>
+        </p:nvSpPr>
+        <p:spPr/>
+        <p:txBody>
+          <a:bodyPr/>
+          <a:lstStyle/>
+          <a:p>
+            <a:r>
+              <a:rPr lang="en-US" dirty="0"/>
+              <a:t>.NET Core after 3.0 and future</a:t>
+            </a:r>
+          </a:p>
+        </p:txBody>
+      </p:sp>
+      <p:pic>
+        <p:nvPicPr>
+          <p:cNvPr id="3" name="Picture 2">
+            <a:extLst>
+              <a:ext uri="{FF2B5EF4-FFF2-40B4-BE49-F238E27FC236}">
+                <a16:creationId xmlns:a16="http://schemas.microsoft.com/office/drawing/2014/main" id="{15C0A358-8DD4-4A96-9143-F40640B973EB}"/>
+              </a:ext>
+            </a:extLst>
+          </p:cNvPr>
+          <p:cNvPicPr>
+            <a:picLocks noChangeAspect="1"/>
+          </p:cNvPicPr>
+          <p:nvPr/>
+        </p:nvPicPr>
+        <p:blipFill>
+          <a:blip r:embed="rId2"/>
+          <a:stretch>
+            <a:fillRect/>
+          </a:stretch>
+        </p:blipFill>
+        <p:spPr>
+          <a:xfrm>
+            <a:off x="2783161" y="2142563"/>
+            <a:ext cx="7421011" cy="4029637"/>
+          </a:xfrm>
+          <a:prstGeom prst="rect">
+            <a:avLst/>
+          </a:prstGeom>
+        </p:spPr>
+      </p:pic>
+      <p:sp>
+        <p:nvSpPr>
+          <p:cNvPr id="6" name="TextBox 5">
+            <a:extLst>
+              <a:ext uri="{FF2B5EF4-FFF2-40B4-BE49-F238E27FC236}">
+                <a16:creationId xmlns:a16="http://schemas.microsoft.com/office/drawing/2014/main" id="{EBDA93B9-FA03-4B37-9736-B2679574438D}"/>
+              </a:ext>
+            </a:extLst>
+          </p:cNvPr>
+          <p:cNvSpPr txBox="1"/>
+          <p:nvPr/>
+        </p:nvSpPr>
+        <p:spPr>
+          <a:xfrm>
+            <a:off x="2392325" y="6172200"/>
+            <a:ext cx="8760603" cy="523220"/>
+          </a:xfrm>
+          <a:prstGeom prst="rect">
+            <a:avLst/>
+          </a:prstGeom>
+          <a:noFill/>
+        </p:spPr>
+        <p:txBody>
+          <a:bodyPr wrap="none" rtlCol="0">
+            <a:spAutoFit/>
+          </a:bodyPr>
+          <a:lstStyle/>
+          <a:p>
+            <a:r>
+              <a:rPr lang="en-US" sz="2800" dirty="0">
+                <a:hlinkClick r:id="rId3"/>
+              </a:rPr>
+              <a:t>https://devblogs.microsoft.com/dotnet/introducing-net-5/</a:t>
+            </a:r>
+            <a:endParaRPr lang="en-US" sz="2800" dirty="0"/>
+          </a:p>
+        </p:txBody>
+      </p:sp>
+    </p:spTree>
+    <p:extLst>
+      <p:ext uri="{BB962C8B-B14F-4D97-AF65-F5344CB8AC3E}">
+        <p14:creationId xmlns:p14="http://schemas.microsoft.com/office/powerpoint/2010/main" val="1897647332"/>
+      </p:ext>
+    </p:extLst>
+  </p:cSld>
+  <p:clrMapOvr>
+    <a:masterClrMapping/>
+  </p:clrMapOvr>
+</p:sld>
+</file>
+
+<file path=ppt/slides/slide26.xml><?xml version="1.0" encoding="utf-8"?>
 <p:sld xmlns:a="http://schemas.openxmlformats.org/drawingml/2006/main" xmlns:r="http://schemas.openxmlformats.org/officeDocument/2006/relationships" xmlns:p="http://schemas.openxmlformats.org/presentationml/2006/main">
   <p:cSld>
     <p:spTree>
@@ -8511,7 +8874,7 @@
           <p:cNvPr id="2" name="Title 1">
             <a:extLst>
               <a:ext uri="{FF2B5EF4-FFF2-40B4-BE49-F238E27FC236}">
-                <a16:creationId xmlns:a16="http://schemas.microsoft.com/office/drawing/2014/main" id="{3C066AF7-0D45-4D6F-B13A-7E670CFA9EAF}"/>
+                <a16:creationId xmlns:a16="http://schemas.microsoft.com/office/drawing/2014/main" id="{D866AFFC-6A1D-4552-9B83-0F49ACDD43F4}"/>
               </a:ext>
             </a:extLst>
           </p:cNvPr>
@@ -8527,14 +8890,7 @@
           <a:bodyPr/>
           <a:lstStyle/>
           <a:p>
-            <a:r>
-              <a:rPr lang="en-US" dirty="0" err="1"/>
-              <a:t>Toolings</a:t>
-            </a:r>
-            <a:r>
-              <a:rPr lang="en-US" dirty="0"/>
-              <a:t> perspective </a:t>
-            </a:r>
+            <a:endParaRPr lang="en-US"/>
           </a:p>
         </p:txBody>
       </p:sp>
@@ -8543,7 +8899,7 @@
           <p:cNvPr id="3" name="Content Placeholder 2">
             <a:extLst>
               <a:ext uri="{FF2B5EF4-FFF2-40B4-BE49-F238E27FC236}">
-                <a16:creationId xmlns:a16="http://schemas.microsoft.com/office/drawing/2014/main" id="{FF6B2163-AAB9-4F28-B144-452AFA7B54FE}"/>
+                <a16:creationId xmlns:a16="http://schemas.microsoft.com/office/drawing/2014/main" id="{56720C5C-FC67-4699-9374-68A1E36DE4F7}"/>
               </a:ext>
             </a:extLst>
           </p:cNvPr>
@@ -8556,59 +8912,17 @@
         </p:nvSpPr>
         <p:spPr/>
         <p:txBody>
-          <a:bodyPr>
-            <a:normAutofit fontScale="85000" lnSpcReduction="10000"/>
-          </a:bodyPr>
-          <a:lstStyle/>
-          <a:p>
-            <a:r>
-              <a:rPr lang="en-US" dirty="0"/>
-              <a:t>There is a hard link between </a:t>
-            </a:r>
-            <a:r>
-              <a:rPr lang="en-US" dirty="0" err="1"/>
-              <a:t>MSBuild</a:t>
-            </a:r>
-            <a:r>
-              <a:rPr lang="en-US" dirty="0"/>
-              <a:t> version (hence Visual Studio update version), .NET Core SDK version, language compiler version and the </a:t>
-            </a:r>
-            <a:r>
-              <a:rPr lang="en-US" dirty="0" err="1"/>
-              <a:t>nuget</a:t>
-            </a:r>
-            <a:r>
-              <a:rPr lang="en-US" dirty="0"/>
-              <a:t> client version used. This is a tooling version link that is available since .NET Core 2.0</a:t>
-            </a:r>
-          </a:p>
-          <a:p>
-            <a:r>
-              <a:rPr lang="en-US" dirty="0"/>
-              <a:t>Current documentation on MS Docs only mention VS version, .NET Core SDK, and starting language compiler version</a:t>
-            </a:r>
-          </a:p>
-          <a:p>
-            <a:r>
-              <a:rPr lang="en-US" dirty="0"/>
-              <a:t>Do not use binding redirect, because binding redirect is valid only for .NET Framework project and assembly resolution. </a:t>
-            </a:r>
-          </a:p>
-          <a:p>
-            <a:r>
-              <a:rPr lang="en-US" dirty="0"/>
-              <a:t>By default, .NET Core 2.0 or later will use latest version available as assembly resolution when compiled. This is different from .NET Framework 4.0 or later, that use stricter model.</a:t>
-            </a:r>
-          </a:p>
-          <a:p>
-            <a:endParaRPr lang="en-US" dirty="0"/>
+          <a:bodyPr/>
+          <a:lstStyle/>
+          <a:p>
+            <a:endParaRPr lang="en-US"/>
           </a:p>
         </p:txBody>
       </p:sp>
     </p:spTree>
     <p:extLst>
       <p:ext uri="{BB962C8B-B14F-4D97-AF65-F5344CB8AC3E}">
-        <p14:creationId xmlns:p14="http://schemas.microsoft.com/office/powerpoint/2010/main" val="84657813"/>
+        <p14:creationId xmlns:p14="http://schemas.microsoft.com/office/powerpoint/2010/main" val="965440430"/>
       </p:ext>
     </p:extLst>
   </p:cSld>
@@ -8640,7 +8954,7 @@
           <p:cNvPr id="2" name="Title 1">
             <a:extLst>
               <a:ext uri="{FF2B5EF4-FFF2-40B4-BE49-F238E27FC236}">
-                <a16:creationId xmlns:a16="http://schemas.microsoft.com/office/drawing/2014/main" id="{E38557FF-E1BC-4546-9FDB-3AC9F359F25B}"/>
+                <a16:creationId xmlns:a16="http://schemas.microsoft.com/office/drawing/2014/main" id="{A6025272-AA85-4F18-A6FA-9815476A8491}"/>
               </a:ext>
             </a:extLst>
           </p:cNvPr>
@@ -8653,75 +8967,79 @@
         </p:nvSpPr>
         <p:spPr/>
         <p:txBody>
-          <a:bodyPr/>
-          <a:lstStyle/>
-          <a:p>
-            <a:r>
-              <a:rPr lang="en-US" dirty="0"/>
-              <a:t>Tooling version train example</a:t>
-            </a:r>
-          </a:p>
-        </p:txBody>
-      </p:sp>
-      <p:sp>
-        <p:nvSpPr>
-          <p:cNvPr id="3" name="Content Placeholder 2">
+          <a:bodyPr>
+            <a:normAutofit/>
+          </a:bodyPr>
+          <a:lstStyle/>
+          <a:p>
+            <a:r>
+              <a:rPr lang="en-US" sz="2800" dirty="0"/>
+              <a:t>.NET Core 3.0 technology stack (from </a:t>
+            </a:r>
+            <a:r>
+              <a:rPr lang="en-US" sz="2800" dirty="0">
+                <a:hlinkClick r:id="rId2"/>
+              </a:rPr>
+              <a:t>https://devblogs.microsoft.com/dotnet/net-core-3-and-support-for-windows-desktop-applications/</a:t>
+            </a:r>
+            <a:r>
+              <a:rPr lang="en-US" sz="2800" dirty="0"/>
+              <a:t>)</a:t>
+            </a:r>
+          </a:p>
+        </p:txBody>
+      </p:sp>
+      <p:pic>
+        <p:nvPicPr>
+          <p:cNvPr id="1026" name="Picture 2">
             <a:extLst>
               <a:ext uri="{FF2B5EF4-FFF2-40B4-BE49-F238E27FC236}">
-                <a16:creationId xmlns:a16="http://schemas.microsoft.com/office/drawing/2014/main" id="{58E4C3AF-F523-4B29-A996-2E5346D31428}"/>
-              </a:ext>
-            </a:extLst>
-          </p:cNvPr>
-          <p:cNvSpPr>
-            <a:spLocks noGrp="1"/>
-          </p:cNvSpPr>
-          <p:nvPr>
-            <p:ph idx="1"/>
-          </p:nvPr>
-        </p:nvSpPr>
-        <p:spPr/>
-        <p:txBody>
-          <a:bodyPr/>
-          <a:lstStyle/>
-          <a:p>
-            <a:endParaRPr lang="en-US"/>
-          </a:p>
-        </p:txBody>
-      </p:sp>
-      <p:pic>
-        <p:nvPicPr>
-          <p:cNvPr id="4" name="Picture 3">
-            <a:extLst>
-              <a:ext uri="{FF2B5EF4-FFF2-40B4-BE49-F238E27FC236}">
-                <a16:creationId xmlns:a16="http://schemas.microsoft.com/office/drawing/2014/main" id="{B3ADDA22-8155-4A16-B2E0-85B74A7AA704}"/>
+                <a16:creationId xmlns:a16="http://schemas.microsoft.com/office/drawing/2014/main" id="{FB9AEB05-FAC2-4DE3-8E3D-C74C3F0F6FC3}"/>
               </a:ext>
             </a:extLst>
           </p:cNvPr>
           <p:cNvPicPr>
-            <a:picLocks noChangeAspect="1"/>
+            <a:picLocks noChangeAspect="1" noChangeArrowheads="1"/>
           </p:cNvPicPr>
           <p:nvPr/>
         </p:nvPicPr>
         <p:blipFill>
-          <a:blip r:embed="rId2"/>
+          <a:blip r:embed="rId3">
+            <a:extLst>
+              <a:ext uri="{28A0092B-C50C-407E-A947-70E740481C1C}">
+                <a14:useLocalDpi xmlns:a14="http://schemas.microsoft.com/office/drawing/2010/main" val="0"/>
+              </a:ext>
+            </a:extLst>
+          </a:blip>
+          <a:srcRect/>
           <a:stretch>
             <a:fillRect/>
           </a:stretch>
         </p:blipFill>
-        <p:spPr>
+        <p:spPr bwMode="auto">
           <a:xfrm>
-            <a:off x="2818294" y="1859529"/>
-            <a:ext cx="7133780" cy="4790192"/>
+            <a:off x="3853195" y="2262788"/>
+            <a:ext cx="4706014" cy="4517773"/>
           </a:xfrm>
           <a:prstGeom prst="rect">
             <a:avLst/>
           </a:prstGeom>
+          <a:noFill/>
+          <a:extLst>
+            <a:ext uri="{909E8E84-426E-40DD-AFC4-6F175D3DCCD1}">
+              <a14:hiddenFill xmlns:a14="http://schemas.microsoft.com/office/drawing/2010/main">
+                <a:solidFill>
+                  <a:srgbClr val="FFFFFF"/>
+                </a:solidFill>
+              </a14:hiddenFill>
+            </a:ext>
+          </a:extLst>
         </p:spPr>
       </p:pic>
     </p:spTree>
     <p:extLst>
       <p:ext uri="{BB962C8B-B14F-4D97-AF65-F5344CB8AC3E}">
-        <p14:creationId xmlns:p14="http://schemas.microsoft.com/office/powerpoint/2010/main" val="3332274354"/>
+        <p14:creationId xmlns:p14="http://schemas.microsoft.com/office/powerpoint/2010/main" val="1668486454"/>
       </p:ext>
     </p:extLst>
   </p:cSld>
@@ -8753,7 +9071,7 @@
           <p:cNvPr id="2" name="Title 1">
             <a:extLst>
               <a:ext uri="{FF2B5EF4-FFF2-40B4-BE49-F238E27FC236}">
-                <a16:creationId xmlns:a16="http://schemas.microsoft.com/office/drawing/2014/main" id="{47FA67C2-3AB9-4159-A9FB-E069A5B85A39}"/>
+                <a16:creationId xmlns:a16="http://schemas.microsoft.com/office/drawing/2014/main" id="{3C066AF7-0D45-4D6F-B13A-7E670CFA9EAF}"/>
               </a:ext>
             </a:extLst>
           </p:cNvPr>
@@ -8770,14 +9088,13 @@
           <a:lstStyle/>
           <a:p>
             <a:r>
+              <a:rPr lang="en-US" dirty="0" err="1"/>
+              <a:t>Toolings</a:t>
+            </a:r>
+            <a:r>
               <a:rPr lang="en-US" dirty="0"/>
-              <a:t>The implicit tooling requirement of </a:t>
-            </a:r>
-            <a:r>
-              <a:rPr lang="en-US" dirty="0" err="1"/>
-              <a:t>nuget</a:t>
-            </a:r>
-            <a:endParaRPr lang="en-US" dirty="0"/>
+              <a:t> perspective </a:t>
+            </a:r>
           </a:p>
         </p:txBody>
       </p:sp>
@@ -8786,7 +9103,7 @@
           <p:cNvPr id="3" name="Content Placeholder 2">
             <a:extLst>
               <a:ext uri="{FF2B5EF4-FFF2-40B4-BE49-F238E27FC236}">
-                <a16:creationId xmlns:a16="http://schemas.microsoft.com/office/drawing/2014/main" id="{635157A1-A06A-492E-AC1D-4F2CA44B643C}"/>
+                <a16:creationId xmlns:a16="http://schemas.microsoft.com/office/drawing/2014/main" id="{FF6B2163-AAB9-4F28-B144-452AFA7B54FE}"/>
               </a:ext>
             </a:extLst>
           </p:cNvPr>
@@ -8799,47 +9116,59 @@
         </p:nvSpPr>
         <p:spPr/>
         <p:txBody>
-          <a:bodyPr/>
-          <a:lstStyle/>
-          <a:p>
-            <a:endParaRPr lang="en-US"/>
-          </a:p>
-        </p:txBody>
-      </p:sp>
-      <p:pic>
-        <p:nvPicPr>
-          <p:cNvPr id="4" name="Picture 3">
-            <a:extLst>
-              <a:ext uri="{FF2B5EF4-FFF2-40B4-BE49-F238E27FC236}">
-                <a16:creationId xmlns:a16="http://schemas.microsoft.com/office/drawing/2014/main" id="{70F9FE10-7206-4788-95E8-86EDA118D373}"/>
-              </a:ext>
-            </a:extLst>
-          </p:cNvPr>
-          <p:cNvPicPr>
-            <a:picLocks noChangeAspect="1"/>
-          </p:cNvPicPr>
-          <p:nvPr/>
-        </p:nvPicPr>
-        <p:blipFill>
-          <a:blip r:embed="rId2"/>
-          <a:stretch>
-            <a:fillRect/>
-          </a:stretch>
-        </p:blipFill>
-        <p:spPr>
-          <a:xfrm>
-            <a:off x="2136937" y="2666999"/>
-            <a:ext cx="8713457" cy="2870181"/>
-          </a:xfrm>
-          <a:prstGeom prst="rect">
-            <a:avLst/>
-          </a:prstGeom>
-        </p:spPr>
-      </p:pic>
+          <a:bodyPr>
+            <a:normAutofit fontScale="85000" lnSpcReduction="10000"/>
+          </a:bodyPr>
+          <a:lstStyle/>
+          <a:p>
+            <a:r>
+              <a:rPr lang="en-US" dirty="0"/>
+              <a:t>There is a hard link between </a:t>
+            </a:r>
+            <a:r>
+              <a:rPr lang="en-US" dirty="0" err="1"/>
+              <a:t>MSBuild</a:t>
+            </a:r>
+            <a:r>
+              <a:rPr lang="en-US" dirty="0"/>
+              <a:t> version (hence Visual Studio update version), .NET Core SDK version, language compiler version and the </a:t>
+            </a:r>
+            <a:r>
+              <a:rPr lang="en-US" dirty="0" err="1"/>
+              <a:t>nuget</a:t>
+            </a:r>
+            <a:r>
+              <a:rPr lang="en-US" dirty="0"/>
+              <a:t> client version used. This is a tooling version link that is available since .NET Core 2.0</a:t>
+            </a:r>
+          </a:p>
+          <a:p>
+            <a:r>
+              <a:rPr lang="en-US" dirty="0"/>
+              <a:t>Current documentation on MS Docs only mention VS version, .NET Core SDK, and starting language compiler version</a:t>
+            </a:r>
+          </a:p>
+          <a:p>
+            <a:r>
+              <a:rPr lang="en-US" dirty="0"/>
+              <a:t>Do not use binding redirect, because binding redirect is valid only for .NET Framework project and assembly resolution. </a:t>
+            </a:r>
+          </a:p>
+          <a:p>
+            <a:r>
+              <a:rPr lang="en-US" dirty="0"/>
+              <a:t>By default, .NET Core 2.0 or later will use latest version available as assembly resolution when compiled. This is different from .NET Framework 4.0 or later, that use stricter model.</a:t>
+            </a:r>
+          </a:p>
+          <a:p>
+            <a:endParaRPr lang="en-US" dirty="0"/>
+          </a:p>
+        </p:txBody>
+      </p:sp>
     </p:spTree>
     <p:extLst>
       <p:ext uri="{BB962C8B-B14F-4D97-AF65-F5344CB8AC3E}">
-        <p14:creationId xmlns:p14="http://schemas.microsoft.com/office/powerpoint/2010/main" val="2175539987"/>
+        <p14:creationId xmlns:p14="http://schemas.microsoft.com/office/powerpoint/2010/main" val="84657813"/>
       </p:ext>
     </p:extLst>
   </p:cSld>

</xml_diff>